<commit_message>
📊 Update final presentation (.pptx) for crop recommendation system
</commit_message>
<xml_diff>
--- a/Projects For Final Exams/Final_Report/Final Project Report Advanced GIS-ML Based Crop Recommendation System for Sustainable.pptx
+++ b/Projects For Final Exams/Final_Report/Final Project Report Advanced GIS-ML Based Crop Recommendation System for Sustainable.pptx
@@ -28,9 +28,10 @@
     <p:sldId id="269" r:id="rId22"/>
     <p:sldId id="270" r:id="rId23"/>
     <p:sldId id="271" r:id="rId24"/>
-    <p:sldId id="272" r:id="rId25"/>
-    <p:sldId id="280" r:id="rId26"/>
-    <p:sldId id="273" r:id="rId27"/>
+    <p:sldId id="283" r:id="rId25"/>
+    <p:sldId id="272" r:id="rId26"/>
+    <p:sldId id="280" r:id="rId27"/>
+    <p:sldId id="273" r:id="rId28"/>
   </p:sldIdLst>
   <p:sldSz cx="12192000" cy="6858000"/>
   <p:notesSz cx="6858000" cy="9144000"/>
@@ -157,12 +158,16 @@
             <p14:sldId id="269"/>
             <p14:sldId id="270"/>
             <p14:sldId id="271"/>
+            <p14:sldId id="283"/>
             <p14:sldId id="272"/>
             <p14:sldId id="280"/>
             <p14:sldId id="273"/>
           </p14:sldIdLst>
         </p14:section>
       </p14:sectionLst>
+    </p:ext>
+    <p:ext uri="{EFAFB233-063F-42B5-8137-9DF3F51BA10A}">
+      <p15:sldGuideLst xmlns:p15="http://schemas.microsoft.com/office/powerpoint/2012/main"/>
     </p:ext>
   </p:extLst>
 </p:presentation>
@@ -499,7 +504,7 @@
           <a:p>
             <a:fld id="{9B2BBC14-37EB-4D50-BB1F-37D8CBD1B42F}" type="datetimeFigureOut">
               <a:rPr lang="en-CA" smtClean="0"/>
-              <a:t>2025-05-24</a:t>
+              <a:t>2025-05-26</a:t>
             </a:fld>
             <a:endParaRPr lang="en-CA"/>
           </a:p>
@@ -823,7 +828,7 @@
           <a:p>
             <a:fld id="{9B2BBC14-37EB-4D50-BB1F-37D8CBD1B42F}" type="datetimeFigureOut">
               <a:rPr lang="en-CA" smtClean="0"/>
-              <a:t>2025-05-24</a:t>
+              <a:t>2025-05-26</a:t>
             </a:fld>
             <a:endParaRPr lang="en-CA"/>
           </a:p>
@@ -1071,7 +1076,7 @@
           <a:p>
             <a:fld id="{9B2BBC14-37EB-4D50-BB1F-37D8CBD1B42F}" type="datetimeFigureOut">
               <a:rPr lang="en-CA" smtClean="0"/>
-              <a:t>2025-05-24</a:t>
+              <a:t>2025-05-26</a:t>
             </a:fld>
             <a:endParaRPr lang="en-CA"/>
           </a:p>
@@ -1410,7 +1415,7 @@
           <a:p>
             <a:fld id="{9B2BBC14-37EB-4D50-BB1F-37D8CBD1B42F}" type="datetimeFigureOut">
               <a:rPr lang="en-CA" smtClean="0"/>
-              <a:t>2025-05-24</a:t>
+              <a:t>2025-05-26</a:t>
             </a:fld>
             <a:endParaRPr lang="en-CA"/>
           </a:p>
@@ -1757,7 +1762,7 @@
           <a:p>
             <a:fld id="{9B2BBC14-37EB-4D50-BB1F-37D8CBD1B42F}" type="datetimeFigureOut">
               <a:rPr lang="en-CA" smtClean="0"/>
-              <a:t>2025-05-24</a:t>
+              <a:t>2025-05-26</a:t>
             </a:fld>
             <a:endParaRPr lang="en-CA"/>
           </a:p>
@@ -2131,7 +2136,7 @@
           <a:p>
             <a:fld id="{9B2BBC14-37EB-4D50-BB1F-37D8CBD1B42F}" type="datetimeFigureOut">
               <a:rPr lang="en-CA" smtClean="0"/>
-              <a:t>2025-05-24</a:t>
+              <a:t>2025-05-26</a:t>
             </a:fld>
             <a:endParaRPr lang="en-CA"/>
           </a:p>
@@ -2601,7 +2606,7 @@
           <a:p>
             <a:fld id="{9B2BBC14-37EB-4D50-BB1F-37D8CBD1B42F}" type="datetimeFigureOut">
               <a:rPr lang="en-CA" smtClean="0"/>
-              <a:t>2025-05-24</a:t>
+              <a:t>2025-05-26</a:t>
             </a:fld>
             <a:endParaRPr lang="en-CA"/>
           </a:p>
@@ -2806,7 +2811,7 @@
           <a:p>
             <a:fld id="{9B2BBC14-37EB-4D50-BB1F-37D8CBD1B42F}" type="datetimeFigureOut">
               <a:rPr lang="en-CA" smtClean="0"/>
-              <a:t>2025-05-24</a:t>
+              <a:t>2025-05-26</a:t>
             </a:fld>
             <a:endParaRPr lang="en-CA"/>
           </a:p>
@@ -3017,7 +3022,7 @@
           <a:p>
             <a:fld id="{9B2BBC14-37EB-4D50-BB1F-37D8CBD1B42F}" type="datetimeFigureOut">
               <a:rPr lang="en-CA" smtClean="0"/>
-              <a:t>2025-05-24</a:t>
+              <a:t>2025-05-26</a:t>
             </a:fld>
             <a:endParaRPr lang="en-CA"/>
           </a:p>
@@ -3249,7 +3254,7 @@
           <a:p>
             <a:fld id="{9B2BBC14-37EB-4D50-BB1F-37D8CBD1B42F}" type="datetimeFigureOut">
               <a:rPr lang="en-CA" smtClean="0"/>
-              <a:t>2025-05-24</a:t>
+              <a:t>2025-05-26</a:t>
             </a:fld>
             <a:endParaRPr lang="en-CA"/>
           </a:p>
@@ -3497,7 +3502,7 @@
           <a:p>
             <a:fld id="{9B2BBC14-37EB-4D50-BB1F-37D8CBD1B42F}" type="datetimeFigureOut">
               <a:rPr lang="en-CA" smtClean="0"/>
-              <a:t>2025-05-24</a:t>
+              <a:t>2025-05-26</a:t>
             </a:fld>
             <a:endParaRPr lang="en-CA"/>
           </a:p>
@@ -3795,7 +3800,7 @@
           <a:p>
             <a:fld id="{9B2BBC14-37EB-4D50-BB1F-37D8CBD1B42F}" type="datetimeFigureOut">
               <a:rPr lang="en-CA" smtClean="0"/>
-              <a:t>2025-05-24</a:t>
+              <a:t>2025-05-26</a:t>
             </a:fld>
             <a:endParaRPr lang="en-CA"/>
           </a:p>
@@ -4189,7 +4194,7 @@
           <a:p>
             <a:fld id="{9B2BBC14-37EB-4D50-BB1F-37D8CBD1B42F}" type="datetimeFigureOut">
               <a:rPr lang="en-CA" smtClean="0"/>
-              <a:t>2025-05-24</a:t>
+              <a:t>2025-05-26</a:t>
             </a:fld>
             <a:endParaRPr lang="en-CA"/>
           </a:p>
@@ -4338,7 +4343,7 @@
           <a:p>
             <a:fld id="{9B2BBC14-37EB-4D50-BB1F-37D8CBD1B42F}" type="datetimeFigureOut">
               <a:rPr lang="en-CA" smtClean="0"/>
-              <a:t>2025-05-24</a:t>
+              <a:t>2025-05-26</a:t>
             </a:fld>
             <a:endParaRPr lang="en-CA"/>
           </a:p>
@@ -4464,7 +4469,7 @@
           <a:p>
             <a:fld id="{9B2BBC14-37EB-4D50-BB1F-37D8CBD1B42F}" type="datetimeFigureOut">
               <a:rPr lang="en-CA" smtClean="0"/>
-              <a:t>2025-05-24</a:t>
+              <a:t>2025-05-26</a:t>
             </a:fld>
             <a:endParaRPr lang="en-CA"/>
           </a:p>
@@ -4719,7 +4724,7 @@
           <a:p>
             <a:fld id="{9B2BBC14-37EB-4D50-BB1F-37D8CBD1B42F}" type="datetimeFigureOut">
               <a:rPr lang="en-CA" smtClean="0"/>
-              <a:t>2025-05-24</a:t>
+              <a:t>2025-05-26</a:t>
             </a:fld>
             <a:endParaRPr lang="en-CA"/>
           </a:p>
@@ -5034,7 +5039,7 @@
           <a:p>
             <a:fld id="{9B2BBC14-37EB-4D50-BB1F-37D8CBD1B42F}" type="datetimeFigureOut">
               <a:rPr lang="en-CA" smtClean="0"/>
-              <a:t>2025-05-24</a:t>
+              <a:t>2025-05-26</a:t>
             </a:fld>
             <a:endParaRPr lang="en-CA"/>
           </a:p>
@@ -5385,7 +5390,7 @@
           <a:p>
             <a:fld id="{9B2BBC14-37EB-4D50-BB1F-37D8CBD1B42F}" type="datetimeFigureOut">
               <a:rPr lang="en-CA" smtClean="0"/>
-              <a:t>2025-05-24</a:t>
+              <a:t>2025-05-26</a:t>
             </a:fld>
             <a:endParaRPr lang="en-CA"/>
           </a:p>
@@ -9321,7 +9326,7 @@
           <p:cNvPr id="2" name="Başlık 1">
             <a:extLst>
               <a:ext uri="{FF2B5EF4-FFF2-40B4-BE49-F238E27FC236}">
-                <a16:creationId xmlns:a16="http://schemas.microsoft.com/office/drawing/2014/main" id="{B4334864-9A61-1C96-37F8-AB9A3AFB7D23}"/>
+                <a16:creationId xmlns:a16="http://schemas.microsoft.com/office/drawing/2014/main" id="{5A6EA900-4E24-C69C-4B2C-3DE4898F5FEB}"/>
               </a:ext>
             </a:extLst>
           </p:cNvPr>
@@ -9332,45 +9337,752 @@
             <p:ph type="title"/>
           </p:nvPr>
         </p:nvSpPr>
-        <p:spPr/>
+        <p:spPr>
+          <a:xfrm>
+            <a:off x="1295402" y="699620"/>
+            <a:ext cx="9601196" cy="1303867"/>
+          </a:xfrm>
+        </p:spPr>
         <p:txBody>
           <a:bodyPr/>
           <a:lstStyle/>
           <a:p>
             <a:r>
               <a:rPr lang="en-CA" dirty="0"/>
-              <a:t>9. Conclusion</a:t>
-            </a:r>
-          </a:p>
-        </p:txBody>
-      </p:sp>
-      <p:sp>
-        <p:nvSpPr>
-          <p:cNvPr id="3" name="İçerik Yer Tutucusu 2">
+              <a:t>📂 Project Repository &amp; Resources</a:t>
+            </a:r>
+          </a:p>
+        </p:txBody>
+      </p:sp>
+      <p:sp>
+        <p:nvSpPr>
+          <p:cNvPr id="4" name="Rectangle 1">
             <a:extLst>
               <a:ext uri="{FF2B5EF4-FFF2-40B4-BE49-F238E27FC236}">
-                <a16:creationId xmlns:a16="http://schemas.microsoft.com/office/drawing/2014/main" id="{F69CDEC6-5717-D043-5185-132230A035A6}"/>
+                <a16:creationId xmlns:a16="http://schemas.microsoft.com/office/drawing/2014/main" id="{A77E6D99-F632-189B-87B6-DBF245DC625D}"/>
               </a:ext>
             </a:extLst>
           </p:cNvPr>
           <p:cNvSpPr>
-            <a:spLocks noGrp="1"/>
+            <a:spLocks noGrp="1" noChangeArrowheads="1"/>
           </p:cNvSpPr>
           <p:nvPr>
             <p:ph idx="1"/>
           </p:nvPr>
         </p:nvSpPr>
-        <p:spPr/>
-        <p:txBody>
-          <a:bodyPr/>
+        <p:spPr bwMode="auto">
+          <a:xfrm>
+            <a:off x="1407426" y="1634065"/>
+            <a:ext cx="9377148" cy="4524315"/>
+          </a:xfrm>
+          <a:prstGeom prst="rect">
+            <a:avLst/>
+          </a:prstGeom>
+          <a:noFill/>
+          <a:ln>
+            <a:noFill/>
+          </a:ln>
+          <a:effectLst/>
+          <a:extLst>
+            <a:ext uri="{909E8E84-426E-40DD-AFC4-6F175D3DCCD1}">
+              <a14:hiddenFill xmlns:a14="http://schemas.microsoft.com/office/drawing/2010/main">
+                <a:solidFill>
+                  <a:schemeClr val="accent1"/>
+                </a:solidFill>
+              </a14:hiddenFill>
+            </a:ext>
+            <a:ext uri="{91240B29-F687-4F45-9708-019B960494DF}">
+              <a14:hiddenLine xmlns:a14="http://schemas.microsoft.com/office/drawing/2010/main" w="9525">
+                <a:solidFill>
+                  <a:schemeClr val="tx1"/>
+                </a:solidFill>
+                <a:miter lim="800000"/>
+                <a:headEnd/>
+                <a:tailEnd/>
+              </a14:hiddenLine>
+            </a:ext>
+            <a:ext uri="{AF507438-7753-43E0-B8FC-AC1667EBCBE1}">
+              <a14:hiddenEffects xmlns:a14="http://schemas.microsoft.com/office/drawing/2010/main">
+                <a:effectLst>
+                  <a:outerShdw dist="35921" dir="2700000" algn="ctr" rotWithShape="0">
+                    <a:schemeClr val="bg2"/>
+                  </a:outerShdw>
+                </a:effectLst>
+              </a14:hiddenEffects>
+            </a:ext>
+          </a:extLst>
+        </p:spPr>
+        <p:txBody>
+          <a:bodyPr vert="horz" wrap="square" lIns="91440" tIns="45720" rIns="91440" bIns="45720" numCol="1" anchor="ctr" anchorCtr="0" compatLnSpc="1">
+            <a:prstTxWarp prst="textNoShape">
+              <a:avLst/>
+            </a:prstTxWarp>
+            <a:spAutoFit/>
+          </a:bodyPr>
           <a:lstStyle/>
           <a:p>
-            <a:pPr marL="0" indent="0">
-              <a:buNone/>
+            <a:pPr marL="0" marR="0" lvl="0" indent="0" algn="l" defTabSz="914400" rtl="0" eaLnBrk="0" fontAlgn="base" latinLnBrk="0" hangingPunct="0">
+              <a:lnSpc>
+                <a:spcPct val="100000"/>
+              </a:lnSpc>
+              <a:spcBef>
+                <a:spcPct val="0"/>
+              </a:spcBef>
+              <a:spcAft>
+                <a:spcPct val="0"/>
+              </a:spcAft>
+              <a:buClrTx/>
+              <a:buSzTx/>
+              <a:buFontTx/>
+              <a:buNone/>
+              <a:tabLst/>
             </a:pPr>
             <a:r>
-              <a:rPr lang="en-CA" dirty="0"/>
-              <a:t>This project successfully developed a GIS-ML-based crop recommendation system for Antalya, Turkey. By utilizing spatial data and machine learning, the system can predict crop suitability and assist farmers in making informed decisions. The system's web interface provides an accessible tool for farmers to receive tailored recommendations, promoting more sustainable agricultural practices.</a:t>
+              <a:rPr kumimoji="0" lang="en-US" altLang="en-US" sz="1800" b="1" i="0" u="none" strike="noStrike" cap="none" normalizeH="0" baseline="0" dirty="0">
+                <a:ln>
+                  <a:noFill/>
+                </a:ln>
+                <a:solidFill>
+                  <a:schemeClr val="tx1"/>
+                </a:solidFill>
+                <a:effectLst/>
+              </a:rPr>
+              <a:t>Slide Content:</a:t>
+            </a:r>
+            <a:endParaRPr kumimoji="0" lang="en-US" altLang="en-US" sz="1800" b="0" i="0" u="none" strike="noStrike" cap="none" normalizeH="0" baseline="0" dirty="0">
+              <a:ln>
+                <a:noFill/>
+              </a:ln>
+              <a:solidFill>
+                <a:schemeClr val="tx1"/>
+              </a:solidFill>
+              <a:effectLst/>
+            </a:endParaRPr>
+          </a:p>
+          <a:p>
+            <a:pPr marL="0" marR="0" lvl="0" indent="0" algn="l" defTabSz="914400" rtl="0" eaLnBrk="0" fontAlgn="base" latinLnBrk="0" hangingPunct="0">
+              <a:lnSpc>
+                <a:spcPct val="100000"/>
+              </a:lnSpc>
+              <a:spcBef>
+                <a:spcPct val="0"/>
+              </a:spcBef>
+              <a:spcAft>
+                <a:spcPct val="0"/>
+              </a:spcAft>
+              <a:buClrTx/>
+              <a:buSzTx/>
+              <a:buFontTx/>
+              <a:buNone/>
+              <a:tabLst/>
+            </a:pPr>
+            <a:r>
+              <a:rPr kumimoji="0" lang="en-US" altLang="en-US" sz="1800" b="0" i="0" u="none" strike="noStrike" cap="none" normalizeH="0" baseline="0" dirty="0">
+                <a:ln>
+                  <a:noFill/>
+                </a:ln>
+                <a:solidFill>
+                  <a:schemeClr val="tx1"/>
+                </a:solidFill>
+                <a:effectLst/>
+              </a:rPr>
+              <a:t>🔗 </a:t>
+            </a:r>
+            <a:r>
+              <a:rPr kumimoji="0" lang="en-US" altLang="en-US" sz="1800" b="1" i="0" u="none" strike="noStrike" cap="none" normalizeH="0" baseline="0" dirty="0">
+                <a:ln>
+                  <a:noFill/>
+                </a:ln>
+                <a:solidFill>
+                  <a:schemeClr val="tx1"/>
+                </a:solidFill>
+                <a:effectLst/>
+              </a:rPr>
+              <a:t>GitHub Link</a:t>
+            </a:r>
+            <a:r>
+              <a:rPr kumimoji="0" lang="tr-TR" altLang="en-US" sz="1800" b="1" i="0" u="none" strike="noStrike" cap="none" normalizeH="0" baseline="0" dirty="0">
+                <a:ln>
+                  <a:noFill/>
+                </a:ln>
+                <a:solidFill>
+                  <a:schemeClr val="tx1"/>
+                </a:solidFill>
+                <a:effectLst/>
+              </a:rPr>
+              <a:t>:   </a:t>
+            </a:r>
+            <a:r>
+              <a:rPr kumimoji="0" lang="en-US" altLang="en-US" sz="1800" b="0" i="0" u="none" strike="noStrike" cap="none" normalizeH="0" baseline="0" dirty="0">
+                <a:ln>
+                  <a:noFill/>
+                </a:ln>
+                <a:solidFill>
+                  <a:schemeClr val="tx1"/>
+                </a:solidFill>
+                <a:effectLst/>
+                <a:hlinkClick r:id="rId2"/>
+              </a:rPr>
+              <a:t>https://github.com/abdramanemhtali/GIS_Projects-For-Final-Exams</a:t>
+            </a:r>
+            <a:endParaRPr kumimoji="0" lang="en-US" altLang="en-US" sz="1800" b="0" i="0" u="none" strike="noStrike" cap="none" normalizeH="0" baseline="0" dirty="0">
+              <a:ln>
+                <a:noFill/>
+              </a:ln>
+              <a:solidFill>
+                <a:schemeClr val="tx1"/>
+              </a:solidFill>
+              <a:effectLst/>
+            </a:endParaRPr>
+          </a:p>
+          <a:p>
+            <a:pPr marL="0" marR="0" lvl="0" indent="0" algn="l" defTabSz="914400" rtl="0" eaLnBrk="0" fontAlgn="base" latinLnBrk="0" hangingPunct="0">
+              <a:lnSpc>
+                <a:spcPct val="100000"/>
+              </a:lnSpc>
+              <a:spcBef>
+                <a:spcPct val="0"/>
+              </a:spcBef>
+              <a:spcAft>
+                <a:spcPct val="0"/>
+              </a:spcAft>
+              <a:buClrTx/>
+              <a:buSzTx/>
+              <a:buFontTx/>
+              <a:buNone/>
+              <a:tabLst/>
+            </a:pPr>
+            <a:endParaRPr kumimoji="0" lang="tr-TR" altLang="en-US" sz="1800" b="0" i="0" u="none" strike="noStrike" cap="none" normalizeH="0" baseline="0" dirty="0">
+              <a:ln>
+                <a:noFill/>
+              </a:ln>
+              <a:solidFill>
+                <a:schemeClr val="tx1"/>
+              </a:solidFill>
+              <a:effectLst/>
+            </a:endParaRPr>
+          </a:p>
+          <a:p>
+            <a:pPr marL="0" marR="0" lvl="0" indent="0" algn="l" defTabSz="914400" rtl="0" eaLnBrk="0" fontAlgn="base" latinLnBrk="0" hangingPunct="0">
+              <a:lnSpc>
+                <a:spcPct val="100000"/>
+              </a:lnSpc>
+              <a:spcBef>
+                <a:spcPct val="0"/>
+              </a:spcBef>
+              <a:spcAft>
+                <a:spcPct val="0"/>
+              </a:spcAft>
+              <a:buClrTx/>
+              <a:buSzTx/>
+              <a:buFontTx/>
+              <a:buNone/>
+              <a:tabLst/>
+            </a:pPr>
+            <a:r>
+              <a:rPr kumimoji="0" lang="en-US" altLang="en-US" sz="1800" b="0" i="0" u="none" strike="noStrike" cap="none" normalizeH="0" baseline="0" dirty="0">
+                <a:ln>
+                  <a:noFill/>
+                </a:ln>
+                <a:solidFill>
+                  <a:schemeClr val="tx1"/>
+                </a:solidFill>
+                <a:effectLst/>
+              </a:rPr>
+              <a:t>📝 </a:t>
+            </a:r>
+            <a:r>
+              <a:rPr kumimoji="0" lang="en-US" altLang="en-US" sz="1800" b="1" i="0" u="none" strike="noStrike" cap="none" normalizeH="0" baseline="0" dirty="0">
+                <a:ln>
+                  <a:noFill/>
+                </a:ln>
+                <a:solidFill>
+                  <a:schemeClr val="tx1"/>
+                </a:solidFill>
+                <a:effectLst/>
+              </a:rPr>
+              <a:t>About the Repository</a:t>
+            </a:r>
+            <a:endParaRPr kumimoji="0" lang="tr-TR" altLang="en-US" sz="1800" b="1" i="0" u="none" strike="noStrike" cap="none" normalizeH="0" baseline="0" dirty="0">
+              <a:ln>
+                <a:noFill/>
+              </a:ln>
+              <a:solidFill>
+                <a:schemeClr val="tx1"/>
+              </a:solidFill>
+              <a:effectLst/>
+            </a:endParaRPr>
+          </a:p>
+          <a:p>
+            <a:pPr marL="0" marR="0" lvl="0" indent="0" algn="l" defTabSz="914400" rtl="0" eaLnBrk="0" fontAlgn="base" latinLnBrk="0" hangingPunct="0">
+              <a:lnSpc>
+                <a:spcPct val="100000"/>
+              </a:lnSpc>
+              <a:spcBef>
+                <a:spcPct val="0"/>
+              </a:spcBef>
+              <a:spcAft>
+                <a:spcPct val="0"/>
+              </a:spcAft>
+              <a:buClrTx/>
+              <a:buSzTx/>
+              <a:buFontTx/>
+              <a:buNone/>
+              <a:tabLst/>
+            </a:pPr>
+            <a:br>
+              <a:rPr kumimoji="0" lang="en-US" altLang="en-US" sz="1800" b="0" i="0" u="none" strike="noStrike" cap="none" normalizeH="0" baseline="0" dirty="0">
+                <a:ln>
+                  <a:noFill/>
+                </a:ln>
+                <a:solidFill>
+                  <a:schemeClr val="tx1"/>
+                </a:solidFill>
+                <a:effectLst/>
+              </a:rPr>
+            </a:br>
+            <a:r>
+              <a:rPr kumimoji="0" lang="en-US" altLang="en-US" sz="1800" b="0" i="0" u="none" strike="noStrike" cap="none" normalizeH="0" baseline="0" dirty="0">
+                <a:ln>
+                  <a:noFill/>
+                </a:ln>
+                <a:solidFill>
+                  <a:schemeClr val="tx1"/>
+                </a:solidFill>
+                <a:effectLst/>
+              </a:rPr>
+              <a:t>This GitHub repository contains all core deliverables of the final project:</a:t>
+            </a:r>
+          </a:p>
+          <a:p>
+            <a:pPr marR="0" lvl="0" algn="l" defTabSz="914400" rtl="0" eaLnBrk="0" fontAlgn="base" latinLnBrk="0" hangingPunct="0">
+              <a:lnSpc>
+                <a:spcPct val="100000"/>
+              </a:lnSpc>
+              <a:spcBef>
+                <a:spcPct val="0"/>
+              </a:spcBef>
+              <a:spcAft>
+                <a:spcPct val="0"/>
+              </a:spcAft>
+              <a:buClrTx/>
+              <a:buSzTx/>
+              <a:buFont typeface="Wingdings" panose="05000000000000000000" pitchFamily="2" charset="2"/>
+              <a:buChar char="Ø"/>
+              <a:tabLst/>
+            </a:pPr>
+            <a:r>
+              <a:rPr kumimoji="0" lang="en-US" altLang="en-US" sz="1800" b="0" i="0" u="none" strike="noStrike" cap="none" normalizeH="0" baseline="0" dirty="0">
+                <a:ln>
+                  <a:noFill/>
+                </a:ln>
+                <a:solidFill>
+                  <a:schemeClr val="tx1"/>
+                </a:solidFill>
+                <a:effectLst/>
+              </a:rPr>
+              <a:t>A comprehensive project report</a:t>
+            </a:r>
+          </a:p>
+          <a:p>
+            <a:pPr marR="0" lvl="0" algn="l" defTabSz="914400" rtl="0" eaLnBrk="0" fontAlgn="base" latinLnBrk="0" hangingPunct="0">
+              <a:lnSpc>
+                <a:spcPct val="100000"/>
+              </a:lnSpc>
+              <a:spcBef>
+                <a:spcPct val="0"/>
+              </a:spcBef>
+              <a:spcAft>
+                <a:spcPct val="0"/>
+              </a:spcAft>
+              <a:buClrTx/>
+              <a:buSzTx/>
+              <a:buFont typeface="Wingdings" panose="05000000000000000000" pitchFamily="2" charset="2"/>
+              <a:buChar char="Ø"/>
+              <a:tabLst/>
+            </a:pPr>
+            <a:r>
+              <a:rPr kumimoji="0" lang="en-US" altLang="en-US" sz="1800" b="0" i="0" u="none" strike="noStrike" cap="none" normalizeH="0" baseline="0" dirty="0">
+                <a:ln>
+                  <a:noFill/>
+                </a:ln>
+                <a:solidFill>
+                  <a:schemeClr val="tx1"/>
+                </a:solidFill>
+                <a:effectLst/>
+              </a:rPr>
+              <a:t>Machine learning model code (</a:t>
+            </a:r>
+            <a:r>
+              <a:rPr kumimoji="0" lang="en-US" altLang="en-US" sz="1800" b="0" i="0" u="none" strike="noStrike" cap="none" normalizeH="0" baseline="0" dirty="0" err="1">
+                <a:ln>
+                  <a:noFill/>
+                </a:ln>
+                <a:solidFill>
+                  <a:schemeClr val="tx1"/>
+                </a:solidFill>
+                <a:effectLst/>
+              </a:rPr>
+              <a:t>Colab</a:t>
+            </a:r>
+            <a:r>
+              <a:rPr kumimoji="0" lang="en-US" altLang="en-US" sz="1800" b="0" i="0" u="none" strike="noStrike" cap="none" normalizeH="0" baseline="0" dirty="0">
+                <a:ln>
+                  <a:noFill/>
+                </a:ln>
+                <a:solidFill>
+                  <a:schemeClr val="tx1"/>
+                </a:solidFill>
+                <a:effectLst/>
+              </a:rPr>
+              <a:t> + Flask/</a:t>
+            </a:r>
+            <a:r>
+              <a:rPr kumimoji="0" lang="en-US" altLang="en-US" sz="1800" b="0" i="0" u="none" strike="noStrike" cap="none" normalizeH="0" baseline="0" dirty="0" err="1">
+                <a:ln>
+                  <a:noFill/>
+                </a:ln>
+                <a:solidFill>
+                  <a:schemeClr val="tx1"/>
+                </a:solidFill>
+                <a:effectLst/>
+              </a:rPr>
+              <a:t>Streamlit</a:t>
+            </a:r>
+            <a:r>
+              <a:rPr kumimoji="0" lang="en-US" altLang="en-US" sz="1800" b="0" i="0" u="none" strike="noStrike" cap="none" normalizeH="0" baseline="0" dirty="0">
+                <a:ln>
+                  <a:noFill/>
+                </a:ln>
+                <a:solidFill>
+                  <a:schemeClr val="tx1"/>
+                </a:solidFill>
+                <a:effectLst/>
+              </a:rPr>
+              <a:t>)</a:t>
+            </a:r>
+          </a:p>
+          <a:p>
+            <a:pPr marR="0" lvl="0" algn="l" defTabSz="914400" rtl="0" eaLnBrk="0" fontAlgn="base" latinLnBrk="0" hangingPunct="0">
+              <a:lnSpc>
+                <a:spcPct val="100000"/>
+              </a:lnSpc>
+              <a:spcBef>
+                <a:spcPct val="0"/>
+              </a:spcBef>
+              <a:spcAft>
+                <a:spcPct val="0"/>
+              </a:spcAft>
+              <a:buClrTx/>
+              <a:buSzTx/>
+              <a:buFont typeface="Wingdings" panose="05000000000000000000" pitchFamily="2" charset="2"/>
+              <a:buChar char="Ø"/>
+              <a:tabLst/>
+            </a:pPr>
+            <a:r>
+              <a:rPr kumimoji="0" lang="en-US" altLang="en-US" sz="1800" b="0" i="0" u="none" strike="noStrike" cap="none" normalizeH="0" baseline="0" dirty="0">
+                <a:ln>
+                  <a:noFill/>
+                </a:ln>
+                <a:solidFill>
+                  <a:schemeClr val="tx1"/>
+                </a:solidFill>
+                <a:effectLst/>
+              </a:rPr>
+              <a:t>Input datasets including raster </a:t>
+            </a:r>
+            <a:r>
+              <a:rPr kumimoji="0" lang="en-US" altLang="en-US" sz="1000" b="0" i="0" u="none" strike="noStrike" cap="none" normalizeH="0" baseline="0" dirty="0">
+                <a:ln>
+                  <a:noFill/>
+                </a:ln>
+                <a:solidFill>
+                  <a:schemeClr val="tx1"/>
+                </a:solidFill>
+                <a:effectLst/>
+              </a:rPr>
+              <a:t>.</a:t>
+            </a:r>
+            <a:r>
+              <a:rPr kumimoji="0" lang="en-US" altLang="en-US" sz="1000" b="0" i="0" u="none" strike="noStrike" cap="none" normalizeH="0" baseline="0" dirty="0" err="1">
+                <a:ln>
+                  <a:noFill/>
+                </a:ln>
+                <a:solidFill>
+                  <a:schemeClr val="tx1"/>
+                </a:solidFill>
+                <a:effectLst/>
+              </a:rPr>
+              <a:t>tif</a:t>
+            </a:r>
+            <a:r>
+              <a:rPr kumimoji="0" lang="en-US" altLang="en-US" sz="1100" b="0" i="0" u="none" strike="noStrike" cap="none" normalizeH="0" baseline="0" dirty="0">
+                <a:ln>
+                  <a:noFill/>
+                </a:ln>
+                <a:solidFill>
+                  <a:schemeClr val="tx1"/>
+                </a:solidFill>
+                <a:effectLst/>
+              </a:rPr>
+              <a:t> files and shapefiles</a:t>
+            </a:r>
+            <a:endParaRPr kumimoji="0" lang="en-US" altLang="en-US" sz="1800" b="0" i="0" u="none" strike="noStrike" cap="none" normalizeH="0" baseline="0" dirty="0">
+              <a:ln>
+                <a:noFill/>
+              </a:ln>
+              <a:solidFill>
+                <a:schemeClr val="tx1"/>
+              </a:solidFill>
+              <a:effectLst/>
+            </a:endParaRPr>
+          </a:p>
+          <a:p>
+            <a:pPr marR="0" lvl="0" algn="l" defTabSz="914400" rtl="0" eaLnBrk="0" fontAlgn="base" latinLnBrk="0" hangingPunct="0">
+              <a:lnSpc>
+                <a:spcPct val="100000"/>
+              </a:lnSpc>
+              <a:spcBef>
+                <a:spcPct val="0"/>
+              </a:spcBef>
+              <a:spcAft>
+                <a:spcPct val="0"/>
+              </a:spcAft>
+              <a:buClrTx/>
+              <a:buSzTx/>
+              <a:buFont typeface="Wingdings" panose="05000000000000000000" pitchFamily="2" charset="2"/>
+              <a:buChar char="Ø"/>
+              <a:tabLst/>
+            </a:pPr>
+            <a:r>
+              <a:rPr kumimoji="0" lang="en-US" altLang="en-US" sz="1800" b="0" i="0" u="none" strike="noStrike" cap="none" normalizeH="0" baseline="0" dirty="0">
+                <a:ln>
+                  <a:noFill/>
+                </a:ln>
+                <a:solidFill>
+                  <a:schemeClr val="tx1"/>
+                </a:solidFill>
+                <a:effectLst/>
+              </a:rPr>
+              <a:t>Suitability prediction maps and exported </a:t>
+            </a:r>
+            <a:r>
+              <a:rPr kumimoji="0" lang="en-US" altLang="en-US" sz="1800" b="0" i="0" u="none" strike="noStrike" cap="none" normalizeH="0" baseline="0" dirty="0" err="1">
+                <a:ln>
+                  <a:noFill/>
+                </a:ln>
+                <a:solidFill>
+                  <a:schemeClr val="tx1"/>
+                </a:solidFill>
+                <a:effectLst/>
+              </a:rPr>
+              <a:t>GeoTIFFs</a:t>
+            </a:r>
+            <a:endParaRPr kumimoji="0" lang="en-US" altLang="en-US" sz="1800" b="0" i="0" u="none" strike="noStrike" cap="none" normalizeH="0" baseline="0" dirty="0">
+              <a:ln>
+                <a:noFill/>
+              </a:ln>
+              <a:solidFill>
+                <a:schemeClr val="tx1"/>
+              </a:solidFill>
+              <a:effectLst/>
+            </a:endParaRPr>
+          </a:p>
+          <a:p>
+            <a:pPr marR="0" lvl="0" algn="l" defTabSz="914400" rtl="0" eaLnBrk="0" fontAlgn="base" latinLnBrk="0" hangingPunct="0">
+              <a:lnSpc>
+                <a:spcPct val="100000"/>
+              </a:lnSpc>
+              <a:spcBef>
+                <a:spcPct val="0"/>
+              </a:spcBef>
+              <a:spcAft>
+                <a:spcPct val="0"/>
+              </a:spcAft>
+              <a:buClrTx/>
+              <a:buSzTx/>
+              <a:buFont typeface="Wingdings" panose="05000000000000000000" pitchFamily="2" charset="2"/>
+              <a:buChar char="Ø"/>
+              <a:tabLst/>
+            </a:pPr>
+            <a:r>
+              <a:rPr kumimoji="0" lang="en-US" altLang="en-US" sz="1800" b="0" i="0" u="none" strike="noStrike" cap="none" normalizeH="0" baseline="0" dirty="0">
+                <a:ln>
+                  <a:noFill/>
+                </a:ln>
+                <a:solidFill>
+                  <a:schemeClr val="tx1"/>
+                </a:solidFill>
+                <a:effectLst/>
+              </a:rPr>
+              <a:t>A deployable web application for interactive crop recommendations</a:t>
+            </a:r>
+            <a:endParaRPr kumimoji="0" lang="tr-TR" altLang="en-US" sz="1800" b="0" i="0" u="none" strike="noStrike" cap="none" normalizeH="0" baseline="0" dirty="0">
+              <a:ln>
+                <a:noFill/>
+              </a:ln>
+              <a:solidFill>
+                <a:schemeClr val="tx1"/>
+              </a:solidFill>
+              <a:effectLst/>
+            </a:endParaRPr>
+          </a:p>
+          <a:p>
+            <a:pPr marR="0" lvl="0" algn="l" defTabSz="914400" rtl="0" eaLnBrk="0" fontAlgn="base" latinLnBrk="0" hangingPunct="0">
+              <a:lnSpc>
+                <a:spcPct val="100000"/>
+              </a:lnSpc>
+              <a:spcBef>
+                <a:spcPct val="0"/>
+              </a:spcBef>
+              <a:spcAft>
+                <a:spcPct val="0"/>
+              </a:spcAft>
+              <a:buClrTx/>
+              <a:buSzTx/>
+              <a:buFont typeface="Wingdings" panose="05000000000000000000" pitchFamily="2" charset="2"/>
+              <a:buChar char="Ø"/>
+              <a:tabLst/>
+            </a:pPr>
+            <a:endParaRPr kumimoji="0" lang="en-US" altLang="en-US" sz="1800" b="0" i="0" u="none" strike="noStrike" cap="none" normalizeH="0" baseline="0" dirty="0">
+              <a:ln>
+                <a:noFill/>
+              </a:ln>
+              <a:solidFill>
+                <a:schemeClr val="tx1"/>
+              </a:solidFill>
+              <a:effectLst/>
+            </a:endParaRPr>
+          </a:p>
+          <a:p>
+            <a:pPr marL="0" marR="0" lvl="0" indent="0" algn="l" defTabSz="914400" rtl="0" eaLnBrk="0" fontAlgn="base" latinLnBrk="0" hangingPunct="0">
+              <a:lnSpc>
+                <a:spcPct val="100000"/>
+              </a:lnSpc>
+              <a:spcBef>
+                <a:spcPct val="0"/>
+              </a:spcBef>
+              <a:spcAft>
+                <a:spcPct val="0"/>
+              </a:spcAft>
+              <a:buClrTx/>
+              <a:buSzTx/>
+              <a:buFontTx/>
+              <a:buNone/>
+              <a:tabLst/>
+            </a:pPr>
+            <a:r>
+              <a:rPr kumimoji="0" lang="en-US" altLang="en-US" sz="1800" b="0" i="0" u="none" strike="noStrike" cap="none" normalizeH="0" baseline="0" dirty="0">
+                <a:ln>
+                  <a:noFill/>
+                </a:ln>
+                <a:solidFill>
+                  <a:schemeClr val="tx1"/>
+                </a:solidFill>
+                <a:effectLst/>
+              </a:rPr>
+              <a:t>📦 </a:t>
+            </a:r>
+            <a:r>
+              <a:rPr kumimoji="0" lang="en-US" altLang="en-US" sz="1800" b="1" i="0" u="none" strike="noStrike" cap="none" normalizeH="0" baseline="0" dirty="0">
+                <a:ln>
+                  <a:noFill/>
+                </a:ln>
+                <a:solidFill>
+                  <a:schemeClr val="tx1"/>
+                </a:solidFill>
+                <a:effectLst/>
+              </a:rPr>
+              <a:t>Usage</a:t>
+            </a:r>
+            <a:endParaRPr kumimoji="0" lang="tr-TR" altLang="en-US" sz="1800" b="1" i="0" u="none" strike="noStrike" cap="none" normalizeH="0" baseline="0" dirty="0">
+              <a:ln>
+                <a:noFill/>
+              </a:ln>
+              <a:solidFill>
+                <a:schemeClr val="tx1"/>
+              </a:solidFill>
+              <a:effectLst/>
+            </a:endParaRPr>
+          </a:p>
+          <a:p>
+            <a:pPr marL="0" marR="0" lvl="0" indent="0" algn="l" defTabSz="914400" rtl="0" eaLnBrk="0" fontAlgn="base" latinLnBrk="0" hangingPunct="0">
+              <a:lnSpc>
+                <a:spcPct val="100000"/>
+              </a:lnSpc>
+              <a:spcBef>
+                <a:spcPct val="0"/>
+              </a:spcBef>
+              <a:spcAft>
+                <a:spcPct val="0"/>
+              </a:spcAft>
+              <a:buClrTx/>
+              <a:buSzTx/>
+              <a:buFontTx/>
+              <a:buNone/>
+              <a:tabLst/>
+            </a:pPr>
+            <a:br>
+              <a:rPr kumimoji="0" lang="en-US" altLang="en-US" sz="1800" b="0" i="0" u="none" strike="noStrike" cap="none" normalizeH="0" baseline="0" dirty="0">
+                <a:ln>
+                  <a:noFill/>
+                </a:ln>
+                <a:solidFill>
+                  <a:schemeClr val="tx1"/>
+                </a:solidFill>
+                <a:effectLst/>
+              </a:rPr>
+            </a:br>
+            <a:r>
+              <a:rPr kumimoji="0" lang="en-US" altLang="en-US" sz="1800" b="0" i="0" u="none" strike="noStrike" cap="none" normalizeH="0" baseline="0" dirty="0">
+                <a:ln>
+                  <a:noFill/>
+                </a:ln>
+                <a:solidFill>
+                  <a:schemeClr val="tx1"/>
+                </a:solidFill>
+                <a:effectLst/>
+              </a:rPr>
+              <a:t>Users can view, clone, or download the full project to test models, review methodology,</a:t>
+            </a:r>
+            <a:endParaRPr kumimoji="0" lang="tr-TR" altLang="en-US" sz="1800" b="0" i="0" u="none" strike="noStrike" cap="none" normalizeH="0" baseline="0" dirty="0">
+              <a:ln>
+                <a:noFill/>
+              </a:ln>
+              <a:solidFill>
+                <a:schemeClr val="tx1"/>
+              </a:solidFill>
+              <a:effectLst/>
+            </a:endParaRPr>
+          </a:p>
+          <a:p>
+            <a:pPr marL="0" marR="0" lvl="0" indent="0" algn="l" defTabSz="914400" rtl="0" eaLnBrk="0" fontAlgn="base" latinLnBrk="0" hangingPunct="0">
+              <a:lnSpc>
+                <a:spcPct val="100000"/>
+              </a:lnSpc>
+              <a:spcBef>
+                <a:spcPct val="0"/>
+              </a:spcBef>
+              <a:spcAft>
+                <a:spcPct val="0"/>
+              </a:spcAft>
+              <a:buClrTx/>
+              <a:buSzTx/>
+              <a:buFontTx/>
+              <a:buNone/>
+              <a:tabLst/>
+            </a:pPr>
+            <a:r>
+              <a:rPr kumimoji="0" lang="en-US" altLang="en-US" sz="1800" b="0" i="0" u="none" strike="noStrike" cap="none" normalizeH="0" baseline="0" dirty="0">
+                <a:ln>
+                  <a:noFill/>
+                </a:ln>
+                <a:solidFill>
+                  <a:schemeClr val="tx1"/>
+                </a:solidFill>
+                <a:effectLst/>
+              </a:rPr>
+              <a:t> or integrate it into future GIS research or agricultural decision-making systems.</a:t>
             </a:r>
           </a:p>
         </p:txBody>
@@ -9378,7 +10090,7 @@
     </p:spTree>
     <p:extLst>
       <p:ext uri="{BB962C8B-B14F-4D97-AF65-F5344CB8AC3E}">
-        <p14:creationId xmlns:p14="http://schemas.microsoft.com/office/powerpoint/2010/main" val="4059286224"/>
+        <p14:creationId xmlns:p14="http://schemas.microsoft.com/office/powerpoint/2010/main" val="149193553"/>
       </p:ext>
     </p:extLst>
   </p:cSld>
@@ -9410,6 +10122,95 @@
           <p:cNvPr id="2" name="Başlık 1">
             <a:extLst>
               <a:ext uri="{FF2B5EF4-FFF2-40B4-BE49-F238E27FC236}">
+                <a16:creationId xmlns:a16="http://schemas.microsoft.com/office/drawing/2014/main" id="{B4334864-9A61-1C96-37F8-AB9A3AFB7D23}"/>
+              </a:ext>
+            </a:extLst>
+          </p:cNvPr>
+          <p:cNvSpPr>
+            <a:spLocks noGrp="1"/>
+          </p:cNvSpPr>
+          <p:nvPr>
+            <p:ph type="title"/>
+          </p:nvPr>
+        </p:nvSpPr>
+        <p:spPr/>
+        <p:txBody>
+          <a:bodyPr/>
+          <a:lstStyle/>
+          <a:p>
+            <a:r>
+              <a:rPr lang="en-CA" dirty="0"/>
+              <a:t>9. Conclusion</a:t>
+            </a:r>
+          </a:p>
+        </p:txBody>
+      </p:sp>
+      <p:sp>
+        <p:nvSpPr>
+          <p:cNvPr id="3" name="İçerik Yer Tutucusu 2">
+            <a:extLst>
+              <a:ext uri="{FF2B5EF4-FFF2-40B4-BE49-F238E27FC236}">
+                <a16:creationId xmlns:a16="http://schemas.microsoft.com/office/drawing/2014/main" id="{F69CDEC6-5717-D043-5185-132230A035A6}"/>
+              </a:ext>
+            </a:extLst>
+          </p:cNvPr>
+          <p:cNvSpPr>
+            <a:spLocks noGrp="1"/>
+          </p:cNvSpPr>
+          <p:nvPr>
+            <p:ph idx="1"/>
+          </p:nvPr>
+        </p:nvSpPr>
+        <p:spPr/>
+        <p:txBody>
+          <a:bodyPr/>
+          <a:lstStyle/>
+          <a:p>
+            <a:pPr marL="0" indent="0">
+              <a:buNone/>
+            </a:pPr>
+            <a:r>
+              <a:rPr lang="en-CA" dirty="0"/>
+              <a:t>This project successfully developed a GIS-ML-based crop recommendation system for Antalya, Turkey. By utilizing spatial data and machine learning, the system can predict crop suitability and assist farmers in making informed decisions. The system's web interface provides an accessible tool for farmers to receive tailored recommendations, promoting more sustainable agricultural practices.</a:t>
+            </a:r>
+          </a:p>
+        </p:txBody>
+      </p:sp>
+    </p:spTree>
+    <p:extLst>
+      <p:ext uri="{BB962C8B-B14F-4D97-AF65-F5344CB8AC3E}">
+        <p14:creationId xmlns:p14="http://schemas.microsoft.com/office/powerpoint/2010/main" val="4059286224"/>
+      </p:ext>
+    </p:extLst>
+  </p:cSld>
+  <p:clrMapOvr>
+    <a:masterClrMapping/>
+  </p:clrMapOvr>
+</p:sld>
+</file>
+
+<file path=ppt/slides/slide26.xml><?xml version="1.0" encoding="utf-8"?>
+<p:sld xmlns:a="http://schemas.openxmlformats.org/drawingml/2006/main" xmlns:r="http://schemas.openxmlformats.org/officeDocument/2006/relationships" xmlns:p="http://schemas.openxmlformats.org/presentationml/2006/main">
+  <p:cSld>
+    <p:spTree>
+      <p:nvGrpSpPr>
+        <p:cNvPr id="1" name=""/>
+        <p:cNvGrpSpPr/>
+        <p:nvPr/>
+      </p:nvGrpSpPr>
+      <p:grpSpPr>
+        <a:xfrm>
+          <a:off x="0" y="0"/>
+          <a:ext cx="0" cy="0"/>
+          <a:chOff x="0" y="0"/>
+          <a:chExt cx="0" cy="0"/>
+        </a:xfrm>
+      </p:grpSpPr>
+      <p:sp>
+        <p:nvSpPr>
+          <p:cNvPr id="2" name="Başlık 1">
+            <a:extLst>
+              <a:ext uri="{FF2B5EF4-FFF2-40B4-BE49-F238E27FC236}">
                 <a16:creationId xmlns:a16="http://schemas.microsoft.com/office/drawing/2014/main" id="{373E9F01-3F1D-3726-6AA5-DAE54DE3AF99}"/>
               </a:ext>
             </a:extLst>
@@ -9564,7 +10365,7 @@
 </p:sld>
 </file>
 
-<file path=ppt/slides/slide26.xml><?xml version="1.0" encoding="utf-8"?>
+<file path=ppt/slides/slide27.xml><?xml version="1.0" encoding="utf-8"?>
 <p:sld xmlns:a="http://schemas.openxmlformats.org/drawingml/2006/main" xmlns:r="http://schemas.openxmlformats.org/officeDocument/2006/relationships" xmlns:p="http://schemas.openxmlformats.org/presentationml/2006/main">
   <p:cSld>
     <p:spTree>

</xml_diff>